<commit_message>
minor chnages to slides
</commit_message>
<xml_diff>
--- a/Week7/W1.03. Project Tools.pptx
+++ b/Week7/W1.03. Project Tools.pptx
@@ -220,6 +220,30 @@
       </pc:sldChg>
     </pc:docChg>
   </pc:docChgLst>
+  <pc:docChgLst>
+    <pc:chgData name="Charles Kiefriter" userId="a996b49251c4dfd2" providerId="LiveId" clId="{8DFA5770-D99C-4CD2-B0B1-88C4F644F0DF}"/>
+    <pc:docChg chg="modSld">
+      <pc:chgData name="Charles Kiefriter" userId="a996b49251c4dfd2" providerId="LiveId" clId="{8DFA5770-D99C-4CD2-B0B1-88C4F644F0DF}" dt="2023-04-18T14:29:13.152" v="17" actId="20577"/>
+      <pc:docMkLst>
+        <pc:docMk/>
+      </pc:docMkLst>
+      <pc:sldChg chg="modSp mod">
+        <pc:chgData name="Charles Kiefriter" userId="a996b49251c4dfd2" providerId="LiveId" clId="{8DFA5770-D99C-4CD2-B0B1-88C4F644F0DF}" dt="2023-04-18T14:29:13.152" v="17" actId="20577"/>
+        <pc:sldMkLst>
+          <pc:docMk/>
+          <pc:sldMk cId="357735422" sldId="257"/>
+        </pc:sldMkLst>
+        <pc:spChg chg="mod">
+          <ac:chgData name="Charles Kiefriter" userId="a996b49251c4dfd2" providerId="LiveId" clId="{8DFA5770-D99C-4CD2-B0B1-88C4F644F0DF}" dt="2023-04-18T14:29:13.152" v="17" actId="20577"/>
+          <ac:spMkLst>
+            <pc:docMk/>
+            <pc:sldMk cId="357735422" sldId="257"/>
+            <ac:spMk id="3" creationId="{36CCF5DC-477C-491B-A8B4-4B07B9CFCC9A}"/>
+          </ac:spMkLst>
+        </pc:spChg>
+      </pc:sldChg>
+    </pc:docChg>
+  </pc:docChgLst>
 </pc:chgInfo>
 </file>
 
@@ -467,7 +491,7 @@
           <a:p>
             <a:fld id="{548C5E67-172B-4F6A-B3B9-DEF72F952E5B}" type="datetimeFigureOut">
               <a:rPr lang="en-US" smtClean="0"/>
-              <a:t>4/13/2023</a:t>
+              <a:t>4/17/2023</a:t>
             </a:fld>
             <a:endParaRPr lang="en-US"/>
           </a:p>
@@ -671,7 +695,7 @@
           <a:p>
             <a:fld id="{548C5E67-172B-4F6A-B3B9-DEF72F952E5B}" type="datetimeFigureOut">
               <a:rPr lang="en-US" smtClean="0"/>
-              <a:t>4/13/2023</a:t>
+              <a:t>4/17/2023</a:t>
             </a:fld>
             <a:endParaRPr lang="en-US"/>
           </a:p>
@@ -865,7 +889,7 @@
           <a:p>
             <a:fld id="{548C5E67-172B-4F6A-B3B9-DEF72F952E5B}" type="datetimeFigureOut">
               <a:rPr lang="en-US" smtClean="0"/>
-              <a:t>4/13/2023</a:t>
+              <a:t>4/17/2023</a:t>
             </a:fld>
             <a:endParaRPr lang="en-US"/>
           </a:p>
@@ -1910,7 +1934,7 @@
           <a:p>
             <a:fld id="{548C5E67-172B-4F6A-B3B9-DEF72F952E5B}" type="datetimeFigureOut">
               <a:rPr lang="en-US" smtClean="0"/>
-              <a:t>4/13/2023</a:t>
+              <a:t>4/17/2023</a:t>
             </a:fld>
             <a:endParaRPr lang="en-US"/>
           </a:p>
@@ -2191,7 +2215,7 @@
           <a:p>
             <a:fld id="{548C5E67-172B-4F6A-B3B9-DEF72F952E5B}" type="datetimeFigureOut">
               <a:rPr lang="en-US" smtClean="0"/>
-              <a:t>4/13/2023</a:t>
+              <a:t>4/17/2023</a:t>
             </a:fld>
             <a:endParaRPr lang="en-US"/>
           </a:p>
@@ -6043,7 +6067,15 @@
             </a:pPr>
             <a:r>
               <a:rPr lang="en-US" dirty="0"/>
-              <a:t>An application that stores and serves up data</a:t>
+              <a:t>An application </a:t>
+            </a:r>
+            <a:r>
+              <a:rPr lang="en-US"/>
+              <a:t>that stores </a:t>
+            </a:r>
+            <a:r>
+              <a:rPr lang="en-US" dirty="0"/>
+              <a:t>and serves up data</a:t>
             </a:r>
           </a:p>
         </p:txBody>

</xml_diff>